<commit_message>
Started on themes. Expanded Todo.
</commit_message>
<xml_diff>
--- a/Design/Ultraviolent Junglist.pptx
+++ b/Design/Ultraviolent Junglist.pptx
@@ -1852,9 +1852,9 @@
             <a:lstStyle/>
             <a:p>
               <a:pPr algn="ctr"/>
-              <a:endParaRPr lang="nl-NL">
+              <a:endParaRPr lang="nl-NL" dirty="0">
                 <a:solidFill>
-                  <a:srgbClr val="1A0F24"/>
+                  <a:srgbClr val="FF0000"/>
                 </a:solidFill>
               </a:endParaRPr>
             </a:p>

</xml_diff>